<commit_message>
image update for black mode
</commit_message>
<xml_diff>
--- a/assets/img/mlstudy/SLP.pptx
+++ b/assets/img/mlstudy/SLP.pptx
@@ -267,7 +267,7 @@
           <a:p>
             <a:fld id="{83148169-736E-449D-A328-437A0ADF942B}" type="datetimeFigureOut">
               <a:rPr lang="ko-KR" altLang="en-US" smtClean="0"/>
-              <a:t>2023-09-26</a:t>
+              <a:t>2023-11-26</a:t>
             </a:fld>
             <a:endParaRPr lang="ko-KR" altLang="en-US"/>
           </a:p>
@@ -465,7 +465,7 @@
           <a:p>
             <a:fld id="{83148169-736E-449D-A328-437A0ADF942B}" type="datetimeFigureOut">
               <a:rPr lang="ko-KR" altLang="en-US" smtClean="0"/>
-              <a:t>2023-09-26</a:t>
+              <a:t>2023-11-26</a:t>
             </a:fld>
             <a:endParaRPr lang="ko-KR" altLang="en-US"/>
           </a:p>
@@ -673,7 +673,7 @@
           <a:p>
             <a:fld id="{83148169-736E-449D-A328-437A0ADF942B}" type="datetimeFigureOut">
               <a:rPr lang="ko-KR" altLang="en-US" smtClean="0"/>
-              <a:t>2023-09-26</a:t>
+              <a:t>2023-11-26</a:t>
             </a:fld>
             <a:endParaRPr lang="ko-KR" altLang="en-US"/>
           </a:p>
@@ -871,7 +871,7 @@
           <a:p>
             <a:fld id="{83148169-736E-449D-A328-437A0ADF942B}" type="datetimeFigureOut">
               <a:rPr lang="ko-KR" altLang="en-US" smtClean="0"/>
-              <a:t>2023-09-26</a:t>
+              <a:t>2023-11-26</a:t>
             </a:fld>
             <a:endParaRPr lang="ko-KR" altLang="en-US"/>
           </a:p>
@@ -1146,7 +1146,7 @@
           <a:p>
             <a:fld id="{83148169-736E-449D-A328-437A0ADF942B}" type="datetimeFigureOut">
               <a:rPr lang="ko-KR" altLang="en-US" smtClean="0"/>
-              <a:t>2023-09-26</a:t>
+              <a:t>2023-11-26</a:t>
             </a:fld>
             <a:endParaRPr lang="ko-KR" altLang="en-US"/>
           </a:p>
@@ -1411,7 +1411,7 @@
           <a:p>
             <a:fld id="{83148169-736E-449D-A328-437A0ADF942B}" type="datetimeFigureOut">
               <a:rPr lang="ko-KR" altLang="en-US" smtClean="0"/>
-              <a:t>2023-09-26</a:t>
+              <a:t>2023-11-26</a:t>
             </a:fld>
             <a:endParaRPr lang="ko-KR" altLang="en-US"/>
           </a:p>
@@ -1823,7 +1823,7 @@
           <a:p>
             <a:fld id="{83148169-736E-449D-A328-437A0ADF942B}" type="datetimeFigureOut">
               <a:rPr lang="ko-KR" altLang="en-US" smtClean="0"/>
-              <a:t>2023-09-26</a:t>
+              <a:t>2023-11-26</a:t>
             </a:fld>
             <a:endParaRPr lang="ko-KR" altLang="en-US"/>
           </a:p>
@@ -1964,7 +1964,7 @@
           <a:p>
             <a:fld id="{83148169-736E-449D-A328-437A0ADF942B}" type="datetimeFigureOut">
               <a:rPr lang="ko-KR" altLang="en-US" smtClean="0"/>
-              <a:t>2023-09-26</a:t>
+              <a:t>2023-11-26</a:t>
             </a:fld>
             <a:endParaRPr lang="ko-KR" altLang="en-US"/>
           </a:p>
@@ -2077,7 +2077,7 @@
           <a:p>
             <a:fld id="{83148169-736E-449D-A328-437A0ADF942B}" type="datetimeFigureOut">
               <a:rPr lang="ko-KR" altLang="en-US" smtClean="0"/>
-              <a:t>2023-09-26</a:t>
+              <a:t>2023-11-26</a:t>
             </a:fld>
             <a:endParaRPr lang="ko-KR" altLang="en-US"/>
           </a:p>
@@ -2388,7 +2388,7 @@
           <a:p>
             <a:fld id="{83148169-736E-449D-A328-437A0ADF942B}" type="datetimeFigureOut">
               <a:rPr lang="ko-KR" altLang="en-US" smtClean="0"/>
-              <a:t>2023-09-26</a:t>
+              <a:t>2023-11-26</a:t>
             </a:fld>
             <a:endParaRPr lang="ko-KR" altLang="en-US"/>
           </a:p>
@@ -2676,7 +2676,7 @@
           <a:p>
             <a:fld id="{83148169-736E-449D-A328-437A0ADF942B}" type="datetimeFigureOut">
               <a:rPr lang="ko-KR" altLang="en-US" smtClean="0"/>
-              <a:t>2023-09-26</a:t>
+              <a:t>2023-11-26</a:t>
             </a:fld>
             <a:endParaRPr lang="ko-KR" altLang="en-US"/>
           </a:p>
@@ -2917,7 +2917,7 @@
           <a:p>
             <a:fld id="{83148169-736E-449D-A328-437A0ADF942B}" type="datetimeFigureOut">
               <a:rPr lang="ko-KR" altLang="en-US" smtClean="0"/>
-              <a:t>2023-09-26</a:t>
+              <a:t>2023-11-26</a:t>
             </a:fld>
             <a:endParaRPr lang="ko-KR" altLang="en-US"/>
           </a:p>
@@ -16644,6 +16644,58 @@
       </p:grpSpPr>
       <p:sp>
         <p:nvSpPr>
+          <p:cNvPr id="2" name="직사각형 1">
+            <a:extLst>
+              <a:ext uri="{FF2B5EF4-FFF2-40B4-BE49-F238E27FC236}">
+                <a16:creationId xmlns:a16="http://schemas.microsoft.com/office/drawing/2014/main" id="{53B1458A-BB07-E291-7844-431E641DF493}"/>
+              </a:ext>
+            </a:extLst>
+          </p:cNvPr>
+          <p:cNvSpPr/>
+          <p:nvPr/>
+        </p:nvSpPr>
+        <p:spPr>
+          <a:xfrm>
+            <a:off x="0" y="203200"/>
+            <a:ext cx="15341600" cy="6654800"/>
+          </a:xfrm>
+          <a:prstGeom prst="rect">
+            <a:avLst/>
+          </a:prstGeom>
+          <a:solidFill>
+            <a:schemeClr val="bg1"/>
+          </a:solidFill>
+          <a:ln>
+            <a:noFill/>
+          </a:ln>
+        </p:spPr>
+        <p:style>
+          <a:lnRef idx="2">
+            <a:schemeClr val="accent1">
+              <a:shade val="15000"/>
+            </a:schemeClr>
+          </a:lnRef>
+          <a:fillRef idx="1">
+            <a:schemeClr val="accent1"/>
+          </a:fillRef>
+          <a:effectRef idx="0">
+            <a:schemeClr val="accent1"/>
+          </a:effectRef>
+          <a:fontRef idx="minor">
+            <a:schemeClr val="lt1"/>
+          </a:fontRef>
+        </p:style>
+        <p:txBody>
+          <a:bodyPr rtlCol="0" anchor="ctr"/>
+          <a:lstStyle/>
+          <a:p>
+            <a:pPr algn="ctr"/>
+            <a:endParaRPr lang="ko-KR" altLang="en-US"/>
+          </a:p>
+        </p:txBody>
+      </p:sp>
+      <p:sp>
+        <p:nvSpPr>
           <p:cNvPr id="5" name="사각형: 둥근 모서리 4">
             <a:extLst>
               <a:ext uri="{FF2B5EF4-FFF2-40B4-BE49-F238E27FC236}">
@@ -17668,6 +17720,58 @@
           <a:chExt cx="0" cy="0"/>
         </a:xfrm>
       </p:grpSpPr>
+      <p:sp>
+        <p:nvSpPr>
+          <p:cNvPr id="3" name="직사각형 2">
+            <a:extLst>
+              <a:ext uri="{FF2B5EF4-FFF2-40B4-BE49-F238E27FC236}">
+                <a16:creationId xmlns:a16="http://schemas.microsoft.com/office/drawing/2014/main" id="{0F4EA2F7-5A1C-120F-ACC0-5EC9166F297F}"/>
+              </a:ext>
+            </a:extLst>
+          </p:cNvPr>
+          <p:cNvSpPr/>
+          <p:nvPr/>
+        </p:nvSpPr>
+        <p:spPr>
+          <a:xfrm>
+            <a:off x="231939" y="570493"/>
+            <a:ext cx="11728121" cy="5168737"/>
+          </a:xfrm>
+          <a:prstGeom prst="rect">
+            <a:avLst/>
+          </a:prstGeom>
+          <a:solidFill>
+            <a:schemeClr val="bg1"/>
+          </a:solidFill>
+          <a:ln>
+            <a:noFill/>
+          </a:ln>
+        </p:spPr>
+        <p:style>
+          <a:lnRef idx="2">
+            <a:schemeClr val="accent1">
+              <a:shade val="15000"/>
+            </a:schemeClr>
+          </a:lnRef>
+          <a:fillRef idx="1">
+            <a:schemeClr val="accent1"/>
+          </a:fillRef>
+          <a:effectRef idx="0">
+            <a:schemeClr val="accent1"/>
+          </a:effectRef>
+          <a:fontRef idx="minor">
+            <a:schemeClr val="lt1"/>
+          </a:fontRef>
+        </p:style>
+        <p:txBody>
+          <a:bodyPr rtlCol="0" anchor="ctr"/>
+          <a:lstStyle/>
+          <a:p>
+            <a:pPr algn="ctr"/>
+            <a:endParaRPr lang="ko-KR" altLang="en-US"/>
+          </a:p>
+        </p:txBody>
+      </p:sp>
       <p:sp>
         <p:nvSpPr>
           <p:cNvPr id="17" name="사각형: 둥근 모서리 16">
@@ -19700,6 +19804,58 @@
           <a:chExt cx="0" cy="0"/>
         </a:xfrm>
       </p:grpSpPr>
+      <p:sp>
+        <p:nvSpPr>
+          <p:cNvPr id="2" name="직사각형 1">
+            <a:extLst>
+              <a:ext uri="{FF2B5EF4-FFF2-40B4-BE49-F238E27FC236}">
+                <a16:creationId xmlns:a16="http://schemas.microsoft.com/office/drawing/2014/main" id="{CF570836-0A83-E3B3-1BF9-ED5B97E0250F}"/>
+              </a:ext>
+            </a:extLst>
+          </p:cNvPr>
+          <p:cNvSpPr/>
+          <p:nvPr/>
+        </p:nvSpPr>
+        <p:spPr>
+          <a:xfrm>
+            <a:off x="231939" y="570493"/>
+            <a:ext cx="11728121" cy="5168737"/>
+          </a:xfrm>
+          <a:prstGeom prst="rect">
+            <a:avLst/>
+          </a:prstGeom>
+          <a:solidFill>
+            <a:schemeClr val="bg1"/>
+          </a:solidFill>
+          <a:ln>
+            <a:noFill/>
+          </a:ln>
+        </p:spPr>
+        <p:style>
+          <a:lnRef idx="2">
+            <a:schemeClr val="accent1">
+              <a:shade val="15000"/>
+            </a:schemeClr>
+          </a:lnRef>
+          <a:fillRef idx="1">
+            <a:schemeClr val="accent1"/>
+          </a:fillRef>
+          <a:effectRef idx="0">
+            <a:schemeClr val="accent1"/>
+          </a:effectRef>
+          <a:fontRef idx="minor">
+            <a:schemeClr val="lt1"/>
+          </a:fontRef>
+        </p:style>
+        <p:txBody>
+          <a:bodyPr rtlCol="0" anchor="ctr"/>
+          <a:lstStyle/>
+          <a:p>
+            <a:pPr algn="ctr"/>
+            <a:endParaRPr lang="ko-KR" altLang="en-US"/>
+          </a:p>
+        </p:txBody>
+      </p:sp>
       <p:cxnSp>
         <p:nvCxnSpPr>
           <p:cNvPr id="9" name="직선 화살표 연결선 8">

</xml_diff>